<commit_message>
Updated from chapters 1 to 4
</commit_message>
<xml_diff>
--- a/Notes/shell-notes.pptx
+++ b/Notes/shell-notes.pptx
@@ -31,6 +31,10 @@
     <p:sldId id="279" r:id="rId25"/>
     <p:sldId id="280" r:id="rId26"/>
     <p:sldId id="281" r:id="rId27"/>
+    <p:sldId id="282" r:id="rId28"/>
+    <p:sldId id="283" r:id="rId29"/>
+    <p:sldId id="284" r:id="rId30"/>
+    <p:sldId id="285" r:id="rId31"/>
   </p:sldIdLst>
   <p:sldSz cx="12192000" cy="6858000"/>
   <p:notesSz cx="6858000" cy="9144000"/>
@@ -5120,11 +5124,7 @@
             </a:r>
             <a:r>
               <a:rPr lang="en-US" dirty="0" smtClean="0"/>
-              <a:t> item1 item2 item3 dir1” - this copies multiple items or directories into the directory dir1</a:t>
-            </a:r>
-            <a:r>
-              <a:rPr lang="en-US" smtClean="0"/>
-              <a:t>. </a:t>
+              <a:t> item1 item2 item3 dir1” - this copies multiple items or directories into the directory dir1. </a:t>
             </a:r>
           </a:p>
         </p:txBody>
@@ -5133,6 +5133,317 @@
     <p:extLst>
       <p:ext uri="{BB962C8B-B14F-4D97-AF65-F5344CB8AC3E}">
         <p14:creationId xmlns:p14="http://schemas.microsoft.com/office/powerpoint/2010/main" val="328651886"/>
+      </p:ext>
+    </p:extLst>
+  </p:cSld>
+  <p:clrMapOvr>
+    <a:masterClrMapping/>
+  </p:clrMapOvr>
+</p:sld>
+</file>
+
+<file path=ppt/slides/slide27.xml><?xml version="1.0" encoding="utf-8"?>
+<p:sld xmlns:a="http://schemas.openxmlformats.org/drawingml/2006/main" xmlns:r="http://schemas.openxmlformats.org/officeDocument/2006/relationships" xmlns:p="http://schemas.openxmlformats.org/presentationml/2006/main">
+  <p:cSld>
+    <p:spTree>
+      <p:nvGrpSpPr>
+        <p:cNvPr id="1" name=""/>
+        <p:cNvGrpSpPr/>
+        <p:nvPr/>
+      </p:nvGrpSpPr>
+      <p:grpSpPr>
+        <a:xfrm>
+          <a:off x="0" y="0"/>
+          <a:ext cx="0" cy="0"/>
+          <a:chOff x="0" y="0"/>
+          <a:chExt cx="0" cy="0"/>
+        </a:xfrm>
+      </p:grpSpPr>
+      <p:sp>
+        <p:nvSpPr>
+          <p:cNvPr id="2" name="Title 1"/>
+          <p:cNvSpPr>
+            <a:spLocks noGrp="1"/>
+          </p:cNvSpPr>
+          <p:nvPr>
+            <p:ph type="title"/>
+          </p:nvPr>
+        </p:nvSpPr>
+        <p:spPr/>
+        <p:txBody>
+          <a:bodyPr/>
+          <a:lstStyle/>
+          <a:p>
+            <a:r>
+              <a:rPr lang="en-US" dirty="0" smtClean="0"/>
+              <a:t>Creating Links</a:t>
+            </a:r>
+            <a:endParaRPr lang="en-US" dirty="0"/>
+          </a:p>
+        </p:txBody>
+      </p:sp>
+      <p:sp>
+        <p:nvSpPr>
+          <p:cNvPr id="3" name="Content Placeholder 2"/>
+          <p:cNvSpPr>
+            <a:spLocks noGrp="1"/>
+          </p:cNvSpPr>
+          <p:nvPr>
+            <p:ph idx="1"/>
+          </p:nvPr>
+        </p:nvSpPr>
+        <p:spPr/>
+        <p:txBody>
+          <a:bodyPr/>
+          <a:lstStyle/>
+          <a:p>
+            <a:r>
+              <a:rPr lang="en-US" dirty="0" smtClean="0"/>
+              <a:t>The </a:t>
+            </a:r>
+            <a:r>
+              <a:rPr lang="en-US" b="1" dirty="0" smtClean="0"/>
+              <a:t>ln</a:t>
+            </a:r>
+            <a:r>
+              <a:rPr lang="en-US" dirty="0" smtClean="0"/>
+              <a:t> command is used to create either hard or symbolic/soft links.</a:t>
+            </a:r>
+          </a:p>
+          <a:p>
+            <a:r>
+              <a:rPr lang="en-US" dirty="0" smtClean="0"/>
+              <a:t>“ln file </a:t>
+            </a:r>
+            <a:r>
+              <a:rPr lang="en-US" i="1" dirty="0" smtClean="0"/>
+              <a:t>link” </a:t>
+            </a:r>
+            <a:r>
+              <a:rPr lang="en-US" dirty="0" smtClean="0"/>
+              <a:t>creates a hard link.</a:t>
+            </a:r>
+          </a:p>
+          <a:p>
+            <a:r>
+              <a:rPr lang="en-US" dirty="0" smtClean="0"/>
+              <a:t>“ln -s item </a:t>
+            </a:r>
+            <a:r>
+              <a:rPr lang="en-US" i="1" dirty="0" smtClean="0"/>
+              <a:t>link”</a:t>
+            </a:r>
+            <a:r>
+              <a:rPr lang="en-US" dirty="0" smtClean="0"/>
+              <a:t> creates a soft link. In this case, item is either a file or a directory.</a:t>
+            </a:r>
+          </a:p>
+        </p:txBody>
+      </p:sp>
+    </p:spTree>
+    <p:extLst>
+      <p:ext uri="{BB962C8B-B14F-4D97-AF65-F5344CB8AC3E}">
+        <p14:creationId xmlns:p14="http://schemas.microsoft.com/office/powerpoint/2010/main" val="1406656898"/>
+      </p:ext>
+    </p:extLst>
+  </p:cSld>
+  <p:clrMapOvr>
+    <a:masterClrMapping/>
+  </p:clrMapOvr>
+</p:sld>
+</file>
+
+<file path=ppt/slides/slide28.xml><?xml version="1.0" encoding="utf-8"?>
+<p:sld xmlns:a="http://schemas.openxmlformats.org/drawingml/2006/main" xmlns:r="http://schemas.openxmlformats.org/officeDocument/2006/relationships" xmlns:p="http://schemas.openxmlformats.org/presentationml/2006/main">
+  <p:cSld>
+    <p:spTree>
+      <p:nvGrpSpPr>
+        <p:cNvPr id="1" name=""/>
+        <p:cNvGrpSpPr/>
+        <p:nvPr/>
+      </p:nvGrpSpPr>
+      <p:grpSpPr>
+        <a:xfrm>
+          <a:off x="0" y="0"/>
+          <a:ext cx="0" cy="0"/>
+          <a:chOff x="0" y="0"/>
+          <a:chExt cx="0" cy="0"/>
+        </a:xfrm>
+      </p:grpSpPr>
+      <p:sp>
+        <p:nvSpPr>
+          <p:cNvPr id="2" name="Title 1"/>
+          <p:cNvSpPr>
+            <a:spLocks noGrp="1"/>
+          </p:cNvSpPr>
+          <p:nvPr>
+            <p:ph type="title"/>
+          </p:nvPr>
+        </p:nvSpPr>
+        <p:spPr/>
+        <p:txBody>
+          <a:bodyPr/>
+          <a:lstStyle/>
+          <a:p>
+            <a:r>
+              <a:rPr lang="en-US" dirty="0" smtClean="0"/>
+              <a:t>Hard Links</a:t>
+            </a:r>
+            <a:endParaRPr lang="en-US" dirty="0"/>
+          </a:p>
+        </p:txBody>
+      </p:sp>
+      <p:sp>
+        <p:nvSpPr>
+          <p:cNvPr id="3" name="Content Placeholder 2"/>
+          <p:cNvSpPr>
+            <a:spLocks noGrp="1"/>
+          </p:cNvSpPr>
+          <p:nvPr>
+            <p:ph idx="1"/>
+          </p:nvPr>
+        </p:nvSpPr>
+        <p:spPr/>
+        <p:txBody>
+          <a:bodyPr/>
+          <a:lstStyle/>
+          <a:p>
+            <a:r>
+              <a:rPr lang="en-US" dirty="0" smtClean="0"/>
+              <a:t>Symbolic links are more modern compared to hard links, but they are the original way on Unix to creating links.</a:t>
+            </a:r>
+          </a:p>
+          <a:p>
+            <a:r>
+              <a:rPr lang="en-US" dirty="0" smtClean="0"/>
+              <a:t>By default, every file has a single hard link that gives the file its name. Recall that “-</a:t>
+            </a:r>
+            <a:r>
+              <a:rPr lang="en-US" dirty="0" err="1"/>
+              <a:t>rw</a:t>
+            </a:r>
+            <a:r>
+              <a:rPr lang="en-US" dirty="0"/>
+              <a:t>-r--r-- 	</a:t>
+            </a:r>
+            <a:r>
+              <a:rPr lang="en-US" dirty="0" smtClean="0"/>
+              <a:t>1 </a:t>
+            </a:r>
+            <a:r>
+              <a:rPr lang="mr-IN" dirty="0" smtClean="0"/>
+              <a:t>…</a:t>
+            </a:r>
+            <a:r>
+              <a:rPr lang="en-US" dirty="0" smtClean="0"/>
+              <a:t>” from the output displayed using the long option, the field ’1’ represents the amount of </a:t>
+            </a:r>
+            <a:r>
+              <a:rPr lang="en-US" b="1" dirty="0" smtClean="0"/>
+              <a:t>hard</a:t>
+            </a:r>
+            <a:r>
+              <a:rPr lang="en-US" dirty="0" smtClean="0"/>
+              <a:t> links the file itself has.</a:t>
+            </a:r>
+          </a:p>
+          <a:p>
+            <a:r>
+              <a:rPr lang="en-US" dirty="0" smtClean="0"/>
+              <a:t>Hard links cannot reference a file outside its own file system. Which means a link cannot reference a file that is not on the same disk partition as the link itself.</a:t>
+            </a:r>
+          </a:p>
+          <a:p>
+            <a:r>
+              <a:rPr lang="en-US" dirty="0" smtClean="0"/>
+              <a:t>Hard links may not reference a directory.</a:t>
+            </a:r>
+          </a:p>
+          <a:p>
+            <a:endParaRPr lang="en-US" dirty="0"/>
+          </a:p>
+        </p:txBody>
+      </p:sp>
+    </p:spTree>
+    <p:extLst>
+      <p:ext uri="{BB962C8B-B14F-4D97-AF65-F5344CB8AC3E}">
+        <p14:creationId xmlns:p14="http://schemas.microsoft.com/office/powerpoint/2010/main" val="1889831334"/>
+      </p:ext>
+    </p:extLst>
+  </p:cSld>
+  <p:clrMapOvr>
+    <a:masterClrMapping/>
+  </p:clrMapOvr>
+</p:sld>
+</file>
+
+<file path=ppt/slides/slide29.xml><?xml version="1.0" encoding="utf-8"?>
+<p:sld xmlns:a="http://schemas.openxmlformats.org/drawingml/2006/main" xmlns:r="http://schemas.openxmlformats.org/officeDocument/2006/relationships" xmlns:p="http://schemas.openxmlformats.org/presentationml/2006/main">
+  <p:cSld>
+    <p:spTree>
+      <p:nvGrpSpPr>
+        <p:cNvPr id="1" name=""/>
+        <p:cNvGrpSpPr/>
+        <p:nvPr/>
+      </p:nvGrpSpPr>
+      <p:grpSpPr>
+        <a:xfrm>
+          <a:off x="0" y="0"/>
+          <a:ext cx="0" cy="0"/>
+          <a:chOff x="0" y="0"/>
+          <a:chExt cx="0" cy="0"/>
+        </a:xfrm>
+      </p:grpSpPr>
+      <p:sp>
+        <p:nvSpPr>
+          <p:cNvPr id="2" name="Title 1"/>
+          <p:cNvSpPr>
+            <a:spLocks noGrp="1"/>
+          </p:cNvSpPr>
+          <p:nvPr>
+            <p:ph type="title"/>
+          </p:nvPr>
+        </p:nvSpPr>
+        <p:spPr/>
+        <p:txBody>
+          <a:bodyPr/>
+          <a:lstStyle/>
+          <a:p>
+            <a:r>
+              <a:rPr lang="en-US" dirty="0" smtClean="0"/>
+              <a:t>Hard links cont.</a:t>
+            </a:r>
+            <a:endParaRPr lang="en-US" dirty="0"/>
+          </a:p>
+        </p:txBody>
+      </p:sp>
+      <p:sp>
+        <p:nvSpPr>
+          <p:cNvPr id="3" name="Content Placeholder 2"/>
+          <p:cNvSpPr>
+            <a:spLocks noGrp="1"/>
+          </p:cNvSpPr>
+          <p:nvPr>
+            <p:ph idx="1"/>
+          </p:nvPr>
+        </p:nvSpPr>
+        <p:spPr/>
+        <p:txBody>
+          <a:bodyPr/>
+          <a:lstStyle/>
+          <a:p>
+            <a:r>
+              <a:rPr lang="en-US" dirty="0" smtClean="0"/>
+              <a:t>When a hard link is deleted, the content of the files remain unchanged until ALL hard links are removed. That means space is not deallocated.</a:t>
+            </a:r>
+            <a:endParaRPr lang="en-US" dirty="0"/>
+          </a:p>
+        </p:txBody>
+      </p:sp>
+    </p:spTree>
+    <p:extLst>
+      <p:ext uri="{BB962C8B-B14F-4D97-AF65-F5344CB8AC3E}">
+        <p14:creationId xmlns:p14="http://schemas.microsoft.com/office/powerpoint/2010/main" val="128902495"/>
       </p:ext>
     </p:extLst>
   </p:cSld>
@@ -5231,6 +5542,108 @@
       </p:par>
     </p:tnLst>
   </p:timing>
+</p:sld>
+</file>
+
+<file path=ppt/slides/slide30.xml><?xml version="1.0" encoding="utf-8"?>
+<p:sld xmlns:a="http://schemas.openxmlformats.org/drawingml/2006/main" xmlns:r="http://schemas.openxmlformats.org/officeDocument/2006/relationships" xmlns:p="http://schemas.openxmlformats.org/presentationml/2006/main">
+  <p:cSld>
+    <p:spTree>
+      <p:nvGrpSpPr>
+        <p:cNvPr id="1" name=""/>
+        <p:cNvGrpSpPr/>
+        <p:nvPr/>
+      </p:nvGrpSpPr>
+      <p:grpSpPr>
+        <a:xfrm>
+          <a:off x="0" y="0"/>
+          <a:ext cx="0" cy="0"/>
+          <a:chOff x="0" y="0"/>
+          <a:chExt cx="0" cy="0"/>
+        </a:xfrm>
+      </p:grpSpPr>
+      <p:sp>
+        <p:nvSpPr>
+          <p:cNvPr id="2" name="Title 1"/>
+          <p:cNvSpPr>
+            <a:spLocks noGrp="1"/>
+          </p:cNvSpPr>
+          <p:nvPr>
+            <p:ph type="title"/>
+          </p:nvPr>
+        </p:nvSpPr>
+        <p:spPr/>
+        <p:txBody>
+          <a:bodyPr/>
+          <a:lstStyle/>
+          <a:p>
+            <a:r>
+              <a:rPr lang="en-US" dirty="0" smtClean="0"/>
+              <a:t>Symbolic Links</a:t>
+            </a:r>
+            <a:endParaRPr lang="en-US" dirty="0"/>
+          </a:p>
+        </p:txBody>
+      </p:sp>
+      <p:sp>
+        <p:nvSpPr>
+          <p:cNvPr id="3" name="Content Placeholder 2"/>
+          <p:cNvSpPr>
+            <a:spLocks noGrp="1"/>
+          </p:cNvSpPr>
+          <p:nvPr>
+            <p:ph idx="1"/>
+          </p:nvPr>
+        </p:nvSpPr>
+        <p:spPr/>
+        <p:txBody>
+          <a:bodyPr/>
+          <a:lstStyle/>
+          <a:p>
+            <a:r>
+              <a:rPr lang="en-US" dirty="0" smtClean="0"/>
+              <a:t>Symbolic links create a file that contain a text pointer to the referenced file or directory.</a:t>
+            </a:r>
+          </a:p>
+          <a:p>
+            <a:r>
+              <a:rPr lang="en-US" dirty="0" smtClean="0"/>
+              <a:t>If a symbolic link points to a file, then we may write to the symbolic link, this will also write to the file it is pointing to. </a:t>
+            </a:r>
+          </a:p>
+          <a:p>
+            <a:r>
+              <a:rPr lang="en-US" dirty="0" smtClean="0"/>
+              <a:t>If we delete the file that the link is pointing to, the link will still exist but will point to nothing. The link is said to be broken.</a:t>
+            </a:r>
+          </a:p>
+          <a:p>
+            <a:r>
+              <a:rPr lang="en-US" dirty="0" smtClean="0"/>
+              <a:t>The </a:t>
+            </a:r>
+            <a:r>
+              <a:rPr lang="en-US" b="1" dirty="0" smtClean="0"/>
+              <a:t>ls </a:t>
+            </a:r>
+            <a:r>
+              <a:rPr lang="en-US" dirty="0" smtClean="0"/>
+              <a:t>command will display broken links in red to reveal their presence.</a:t>
+            </a:r>
+            <a:endParaRPr lang="en-US" dirty="0"/>
+          </a:p>
+        </p:txBody>
+      </p:sp>
+    </p:spTree>
+    <p:extLst>
+      <p:ext uri="{BB962C8B-B14F-4D97-AF65-F5344CB8AC3E}">
+        <p14:creationId xmlns:p14="http://schemas.microsoft.com/office/powerpoint/2010/main" val="1963402897"/>
+      </p:ext>
+    </p:extLst>
+  </p:cSld>
+  <p:clrMapOvr>
+    <a:masterClrMapping/>
+  </p:clrMapOvr>
 </p:sld>
 </file>
 

</xml_diff>